<commit_message>
Update ANL201 Study Unit 6_2022 - Lecturer.pptx
</commit_message>
<xml_diff>
--- a/SuSS/2022_ANL201_Viz_Biz/3_Lecture/ANL201 Study Unit 6_2022 - Lecturer.pptx
+++ b/SuSS/2022_ANL201_Viz_Biz/3_Lecture/ANL201 Study Unit 6_2022 - Lecturer.pptx
@@ -244,7 +244,7 @@
           <a:p>
             <a:fld id="{FB7F86EF-755F-EF49-95CD-E6F9DEA0E285}" type="datetimeFigureOut">
               <a:rPr lang="en-US" smtClean="0"/>
-              <a:t>1/20/2022</a:t>
+              <a:t>3/10/2022</a:t>
             </a:fld>
             <a:endParaRPr lang="en-US"/>
           </a:p>
@@ -409,7 +409,7 @@
           <a:p>
             <a:fld id="{847550CD-65C1-0D40-9457-6DF5C95A232D}" type="datetimeFigureOut">
               <a:rPr lang="en-US" smtClean="0"/>
-              <a:t>1/20/2022</a:t>
+              <a:t>3/10/2022</a:t>
             </a:fld>
             <a:endParaRPr lang="en-US"/>
           </a:p>
@@ -20582,6 +20582,25 @@
               <a:spcBef>
                 <a:spcPts val="0"/>
               </a:spcBef>
+              <a:buClr>
+                <a:srgbClr val="CE0000"/>
+              </a:buClr>
+              <a:buFont typeface="System Font Regular"/>
+              <a:buChar char="‣"/>
+            </a:pPr>
+            <a:endParaRPr lang="en-GB" sz="1800" i="1" dirty="0">
+              <a:solidFill>
+                <a:srgbClr val="01385B"/>
+              </a:solidFill>
+              <a:latin typeface="Roboto" panose="02000000000000000000" pitchFamily="2" charset="0"/>
+              <a:ea typeface="Roboto" panose="02000000000000000000" pitchFamily="2" charset="0"/>
+            </a:endParaRPr>
+          </a:p>
+          <a:p>
+            <a:pPr marL="177800" indent="-177800">
+              <a:spcBef>
+                <a:spcPts val="0"/>
+              </a:spcBef>
               <a:spcAft>
                 <a:spcPts val="1200"/>
               </a:spcAft>
@@ -20739,7 +20758,7 @@
         </p:nvSpPr>
         <p:spPr>
           <a:xfrm>
-            <a:off x="2154245" y="3272971"/>
+            <a:off x="603423" y="3272971"/>
             <a:ext cx="2562897" cy="224972"/>
           </a:xfrm>
           <a:prstGeom prst="rect">
@@ -20798,7 +20817,7 @@
         </p:nvSpPr>
         <p:spPr>
           <a:xfrm>
-            <a:off x="3678245" y="4268167"/>
+            <a:off x="2646802" y="4258289"/>
             <a:ext cx="3397469" cy="224972"/>
           </a:xfrm>
           <a:prstGeom prst="rect">
@@ -20838,7 +20857,7 @@
                   <a:srgbClr val="6600FF"/>
                 </a:solidFill>
               </a:rPr>
-              <a:t>(Can be a demotivator too – be careful)</a:t>
+              <a:t>Can be a demotivator too – be careful</a:t>
             </a:r>
           </a:p>
         </p:txBody>
@@ -28747,12 +28766,12 @@
 </file>
 
 <file path=customXml/item1.xml><?xml version="1.0" encoding="utf-8"?>
-<p:properties xmlns:p="http://schemas.microsoft.com/office/2006/metadata/properties" xmlns:xsi="http://www.w3.org/2001/XMLSchema-instance" xmlns:pc="http://schemas.microsoft.com/office/infopath/2007/PartnerControls">
-  <documentManagement>
-    <_Version xmlns="http://schemas.microsoft.com/sharepoint/v3/fields" xsi:nil="true"/>
-    <_Status xmlns="http://schemas.microsoft.com/sharepoint/v3/fields">Not Started</_Status>
-  </documentManagement>
-</p:properties>
+<?mso-contentType ?>
+<FormTemplates xmlns="http://schemas.microsoft.com/sharepoint/v3/contenttype/forms">
+  <Display>DocumentLibraryForm</Display>
+  <Edit>DocumentLibraryForm</Edit>
+  <New>DocumentLibraryForm</New>
+</FormTemplates>
 </file>
 
 <file path=customXml/item2.xml><?xml version="1.0" encoding="utf-8"?>
@@ -28900,26 +28919,18 @@
 </file>
 
 <file path=customXml/item3.xml><?xml version="1.0" encoding="utf-8"?>
-<?mso-contentType ?>
-<FormTemplates xmlns="http://schemas.microsoft.com/sharepoint/v3/contenttype/forms">
-  <Display>DocumentLibraryForm</Display>
-  <Edit>DocumentLibraryForm</Edit>
-  <New>DocumentLibraryForm</New>
-</FormTemplates>
+<p:properties xmlns:p="http://schemas.microsoft.com/office/2006/metadata/properties" xmlns:xsi="http://www.w3.org/2001/XMLSchema-instance" xmlns:pc="http://schemas.microsoft.com/office/infopath/2007/PartnerControls">
+  <documentManagement>
+    <_Version xmlns="http://schemas.microsoft.com/sharepoint/v3/fields" xsi:nil="true"/>
+    <_Status xmlns="http://schemas.microsoft.com/sharepoint/v3/fields">Not Started</_Status>
+  </documentManagement>
+</p:properties>
 </file>
 
 <file path=customXml/itemProps1.xml><?xml version="1.0" encoding="utf-8"?>
-<ds:datastoreItem xmlns:ds="http://schemas.openxmlformats.org/officeDocument/2006/customXml" ds:itemID="{7B6F2769-7194-4217-93D3-3AF3A4742282}">
+<ds:datastoreItem xmlns:ds="http://schemas.openxmlformats.org/officeDocument/2006/customXml" ds:itemID="{87D2A1B0-FF3E-4009-940D-AED0EB70AA20}">
   <ds:schemaRefs>
-    <ds:schemaRef ds:uri="http://purl.org/dc/terms/"/>
-    <ds:schemaRef ds:uri="http://schemas.openxmlformats.org/package/2006/metadata/core-properties"/>
-    <ds:schemaRef ds:uri="http://purl.org/dc/dcmitype/"/>
-    <ds:schemaRef ds:uri="http://schemas.microsoft.com/office/infopath/2007/PartnerControls"/>
-    <ds:schemaRef ds:uri="http://schemas.microsoft.com/office/2006/documentManagement/types"/>
-    <ds:schemaRef ds:uri="http://purl.org/dc/elements/1.1/"/>
-    <ds:schemaRef ds:uri="http://schemas.microsoft.com/office/2006/metadata/properties"/>
-    <ds:schemaRef ds:uri="http://schemas.microsoft.com/sharepoint/v3/fields"/>
-    <ds:schemaRef ds:uri="http://www.w3.org/XML/1998/namespace"/>
+    <ds:schemaRef ds:uri="http://schemas.microsoft.com/sharepoint/v3/contenttype/forms"/>
   </ds:schemaRefs>
 </ds:datastoreItem>
 </file>
@@ -28943,9 +28954,17 @@
 </file>
 
 <file path=customXml/itemProps3.xml><?xml version="1.0" encoding="utf-8"?>
-<ds:datastoreItem xmlns:ds="http://schemas.openxmlformats.org/officeDocument/2006/customXml" ds:itemID="{87D2A1B0-FF3E-4009-940D-AED0EB70AA20}">
+<ds:datastoreItem xmlns:ds="http://schemas.openxmlformats.org/officeDocument/2006/customXml" ds:itemID="{7B6F2769-7194-4217-93D3-3AF3A4742282}">
   <ds:schemaRefs>
-    <ds:schemaRef ds:uri="http://schemas.microsoft.com/sharepoint/v3/contenttype/forms"/>
+    <ds:schemaRef ds:uri="http://purl.org/dc/terms/"/>
+    <ds:schemaRef ds:uri="http://schemas.openxmlformats.org/package/2006/metadata/core-properties"/>
+    <ds:schemaRef ds:uri="http://purl.org/dc/dcmitype/"/>
+    <ds:schemaRef ds:uri="http://schemas.microsoft.com/office/infopath/2007/PartnerControls"/>
+    <ds:schemaRef ds:uri="http://schemas.microsoft.com/office/2006/documentManagement/types"/>
+    <ds:schemaRef ds:uri="http://purl.org/dc/elements/1.1/"/>
+    <ds:schemaRef ds:uri="http://schemas.microsoft.com/office/2006/metadata/properties"/>
+    <ds:schemaRef ds:uri="http://schemas.microsoft.com/sharepoint/v3/fields"/>
+    <ds:schemaRef ds:uri="http://www.w3.org/XML/1998/namespace"/>
   </ds:schemaRefs>
 </ds:datastoreItem>
 </file>
</xml_diff>